<commit_message>
hozzáadtam a játék részletesebb leírását
</commit_message>
<xml_diff>
--- a/Forza secret edition tervezése SZM, VM.pptx
+++ b/Forza secret edition tervezése SZM, VM.pptx
@@ -247,7 +247,7 @@
           <a:effectLst/>
           <a:extLst>
             <a:ext uri="{91240B29-F687-4f45-9708-019B960494DF}">
-              <a14:hiddenLine xmlns="" xmlns:a14="http://schemas.microsoft.com/office/drawing/2010/main" w="9525">
+              <a14:hiddenLine xmlns:a14="http://schemas.microsoft.com/office/drawing/2010/main" xmlns="" w="9525">
                 <a:solidFill>
                   <a:srgbClr val="000000"/>
                 </a:solidFill>
@@ -1781,7 +1781,7 @@
           <a:ln/>
           <a:extLst>
             <a:ext uri="{91240B29-F687-4f45-9708-019B960494DF}">
-              <a14:hiddenLine xmlns="" xmlns:a14="http://schemas.microsoft.com/office/drawing/2010/main" w="9525">
+              <a14:hiddenLine xmlns:a14="http://schemas.microsoft.com/office/drawing/2010/main" xmlns="" w="9525">
                 <a:solidFill>
                   <a:srgbClr val="000000"/>
                 </a:solidFill>
@@ -2059,7 +2059,7 @@
           <a:ln/>
           <a:extLst>
             <a:ext uri="{91240B29-F687-4f45-9708-019B960494DF}">
-              <a14:hiddenLine xmlns="" xmlns:a14="http://schemas.microsoft.com/office/drawing/2010/main" w="9525">
+              <a14:hiddenLine xmlns:a14="http://schemas.microsoft.com/office/drawing/2010/main" xmlns="" w="9525">
                 <a:solidFill>
                   <a:srgbClr val="000000"/>
                 </a:solidFill>
@@ -2345,7 +2345,7 @@
           <a:ln/>
           <a:extLst>
             <a:ext uri="{91240B29-F687-4f45-9708-019B960494DF}">
-              <a14:hiddenLine xmlns="" xmlns:a14="http://schemas.microsoft.com/office/drawing/2010/main" w="9525">
+              <a14:hiddenLine xmlns:a14="http://schemas.microsoft.com/office/drawing/2010/main" xmlns="" w="9525">
                 <a:solidFill>
                   <a:srgbClr val="000000"/>
                 </a:solidFill>
@@ -2977,7 +2977,7 @@
           <a:ln/>
           <a:extLst>
             <a:ext uri="{91240B29-F687-4f45-9708-019B960494DF}">
-              <a14:hiddenLine xmlns="" xmlns:a14="http://schemas.microsoft.com/office/drawing/2010/main" w="9525">
+              <a14:hiddenLine xmlns:a14="http://schemas.microsoft.com/office/drawing/2010/main" xmlns="" w="9525">
                 <a:solidFill>
                   <a:srgbClr val="000000"/>
                 </a:solidFill>
@@ -3319,7 +3319,7 @@
           <a:ln/>
           <a:extLst>
             <a:ext uri="{91240B29-F687-4f45-9708-019B960494DF}">
-              <a14:hiddenLine xmlns="" xmlns:a14="http://schemas.microsoft.com/office/drawing/2010/main" w="9525">
+              <a14:hiddenLine xmlns:a14="http://schemas.microsoft.com/office/drawing/2010/main" xmlns="" w="9525">
                 <a:solidFill>
                   <a:srgbClr val="000000"/>
                 </a:solidFill>
@@ -3799,7 +3799,7 @@
           <a:ln/>
           <a:extLst>
             <a:ext uri="{91240B29-F687-4f45-9708-019B960494DF}">
-              <a14:hiddenLine xmlns="" xmlns:a14="http://schemas.microsoft.com/office/drawing/2010/main" w="9525">
+              <a14:hiddenLine xmlns:a14="http://schemas.microsoft.com/office/drawing/2010/main" xmlns="" w="9525">
                 <a:solidFill>
                   <a:srgbClr val="000000"/>
                 </a:solidFill>
@@ -4234,7 +4234,7 @@
           <a:ln/>
           <a:extLst>
             <a:ext uri="{91240B29-F687-4f45-9708-019B960494DF}">
-              <a14:hiddenLine xmlns="" xmlns:a14="http://schemas.microsoft.com/office/drawing/2010/main" w="9525">
+              <a14:hiddenLine xmlns:a14="http://schemas.microsoft.com/office/drawing/2010/main" xmlns="" w="9525">
                 <a:solidFill>
                   <a:srgbClr val="000000"/>
                 </a:solidFill>
@@ -5675,6 +5675,21 @@
               </a:rPr>
               <a:t>/Projekt1 (github.com)</a:t>
             </a:r>
+            <a:endParaRPr lang="hu-HU" dirty="0"/>
+          </a:p>
+          <a:p>
+            <a:r>
+              <a:rPr lang="hu-HU" dirty="0">
+                <a:hlinkClick r:id="rId3" action="ppaction://hlinkfile">
+                  <a:extLst>
+                    <a:ext uri="{A12FA001-AC4F-418D-AE19-62706E023703}">
+                      <ahyp:hlinkClr xmlns:ahyp="http://schemas.microsoft.com/office/drawing/2018/hyperlinkcolor" val="tx"/>
+                    </a:ext>
+                  </a:extLst>
+                </a:hlinkClick>
+              </a:rPr>
+              <a:t>Játék rövid leírása.docx</a:t>
+            </a:r>
             <a:r>
               <a:rPr lang="hu-HU" dirty="0"/>
               <a:t>  </a:t>

</xml_diff>